<commit_message>
add wk 3 lesson 1
</commit_message>
<xml_diff>
--- a/02-VBA-Scripting/Classwork/3/Activity Instructions.pptx
+++ b/02-VBA-Scripting/Classwork/3/Activity Instructions.pptx
@@ -1,6 +1,6 @@
 
 <file path=ppt/presentation.xml><?xml version="1.0" encoding="utf-8"?>
-<p:presentation xmlns:a="http://schemas.openxmlformats.org/drawingml/2006/main" xmlns:r="http://schemas.openxmlformats.org/officeDocument/2006/relationships" xmlns:p="http://schemas.openxmlformats.org/presentationml/2006/main" saveSubsetFonts="1">
+<p:presentation xmlns:a="http://schemas.openxmlformats.org/drawingml/2006/main" xmlns:r="http://schemas.openxmlformats.org/officeDocument/2006/relationships" xmlns:p="http://schemas.openxmlformats.org/presentationml/2006/main" embedTrueTypeFonts="1" saveSubsetFonts="1">
   <p:sldMasterIdLst>
     <p:sldMasterId id="2147483648" r:id="rId1"/>
   </p:sldMasterIdLst>
@@ -14,6 +14,20 @@
   </p:sldIdLst>
   <p:sldSz cx="12192000" cy="6858000"/>
   <p:notesSz cx="6858000" cy="9144000"/>
+  <p:embeddedFontLst>
+    <p:embeddedFont>
+      <p:font typeface="Calibri" panose="020F0502020204030204" pitchFamily="34" charset="0"/>
+      <p:regular r:id="rId8"/>
+      <p:bold r:id="rId9"/>
+      <p:italic r:id="rId10"/>
+      <p:boldItalic r:id="rId11"/>
+    </p:embeddedFont>
+    <p:embeddedFont>
+      <p:font typeface="Calibri Light" panose="020F0302020204030204" pitchFamily="34" charset="0"/>
+      <p:regular r:id="rId12"/>
+      <p:italic r:id="rId13"/>
+    </p:embeddedFont>
+  </p:embeddedFontLst>
   <p:defaultTextStyle>
     <a:defPPr>
       <a:defRPr lang="en-US"/>
@@ -109,6 +123,11 @@
       </a:defRPr>
     </a:lvl9pPr>
   </p:defaultTextStyle>
+  <p:extLst>
+    <p:ext uri="{EFAFB233-063F-42B5-8137-9DF3F51BA10A}">
+      <p15:sldGuideLst xmlns:p15="http://schemas.microsoft.com/office/powerpoint/2012/main"/>
+    </p:ext>
+  </p:extLst>
 </p:presentation>
 </file>
 
@@ -243,7 +262,7 @@
           <a:p>
             <a:fld id="{19B110E3-DCD1-4DCD-BD6F-A0D8C064B635}" type="datetimeFigureOut">
               <a:rPr lang="en-US" smtClean="0"/>
-              <a:t>9/28/2018</a:t>
+              <a:t>9/29/2018</a:t>
             </a:fld>
             <a:endParaRPr lang="en-US"/>
           </a:p>
@@ -413,7 +432,7 @@
           <a:p>
             <a:fld id="{19B110E3-DCD1-4DCD-BD6F-A0D8C064B635}" type="datetimeFigureOut">
               <a:rPr lang="en-US" smtClean="0"/>
-              <a:t>9/28/2018</a:t>
+              <a:t>9/29/2018</a:t>
             </a:fld>
             <a:endParaRPr lang="en-US"/>
           </a:p>
@@ -593,7 +612,7 @@
           <a:p>
             <a:fld id="{19B110E3-DCD1-4DCD-BD6F-A0D8C064B635}" type="datetimeFigureOut">
               <a:rPr lang="en-US" smtClean="0"/>
-              <a:t>9/28/2018</a:t>
+              <a:t>9/29/2018</a:t>
             </a:fld>
             <a:endParaRPr lang="en-US"/>
           </a:p>
@@ -763,7 +782,7 @@
           <a:p>
             <a:fld id="{19B110E3-DCD1-4DCD-BD6F-A0D8C064B635}" type="datetimeFigureOut">
               <a:rPr lang="en-US" smtClean="0"/>
-              <a:t>9/28/2018</a:t>
+              <a:t>9/29/2018</a:t>
             </a:fld>
             <a:endParaRPr lang="en-US"/>
           </a:p>
@@ -1009,7 +1028,7 @@
           <a:p>
             <a:fld id="{19B110E3-DCD1-4DCD-BD6F-A0D8C064B635}" type="datetimeFigureOut">
               <a:rPr lang="en-US" smtClean="0"/>
-              <a:t>9/28/2018</a:t>
+              <a:t>9/29/2018</a:t>
             </a:fld>
             <a:endParaRPr lang="en-US"/>
           </a:p>
@@ -1241,7 +1260,7 @@
           <a:p>
             <a:fld id="{19B110E3-DCD1-4DCD-BD6F-A0D8C064B635}" type="datetimeFigureOut">
               <a:rPr lang="en-US" smtClean="0"/>
-              <a:t>9/28/2018</a:t>
+              <a:t>9/29/2018</a:t>
             </a:fld>
             <a:endParaRPr lang="en-US"/>
           </a:p>
@@ -1608,7 +1627,7 @@
           <a:p>
             <a:fld id="{19B110E3-DCD1-4DCD-BD6F-A0D8C064B635}" type="datetimeFigureOut">
               <a:rPr lang="en-US" smtClean="0"/>
-              <a:t>9/28/2018</a:t>
+              <a:t>9/29/2018</a:t>
             </a:fld>
             <a:endParaRPr lang="en-US"/>
           </a:p>
@@ -1726,7 +1745,7 @@
           <a:p>
             <a:fld id="{19B110E3-DCD1-4DCD-BD6F-A0D8C064B635}" type="datetimeFigureOut">
               <a:rPr lang="en-US" smtClean="0"/>
-              <a:t>9/28/2018</a:t>
+              <a:t>9/29/2018</a:t>
             </a:fld>
             <a:endParaRPr lang="en-US"/>
           </a:p>
@@ -1821,7 +1840,7 @@
           <a:p>
             <a:fld id="{19B110E3-DCD1-4DCD-BD6F-A0D8C064B635}" type="datetimeFigureOut">
               <a:rPr lang="en-US" smtClean="0"/>
-              <a:t>9/28/2018</a:t>
+              <a:t>9/29/2018</a:t>
             </a:fld>
             <a:endParaRPr lang="en-US"/>
           </a:p>
@@ -2098,7 +2117,7 @@
           <a:p>
             <a:fld id="{19B110E3-DCD1-4DCD-BD6F-A0D8C064B635}" type="datetimeFigureOut">
               <a:rPr lang="en-US" smtClean="0"/>
-              <a:t>9/28/2018</a:t>
+              <a:t>9/29/2018</a:t>
             </a:fld>
             <a:endParaRPr lang="en-US"/>
           </a:p>
@@ -2351,7 +2370,7 @@
           <a:p>
             <a:fld id="{19B110E3-DCD1-4DCD-BD6F-A0D8C064B635}" type="datetimeFigureOut">
               <a:rPr lang="en-US" smtClean="0"/>
-              <a:t>9/28/2018</a:t>
+              <a:t>9/29/2018</a:t>
             </a:fld>
             <a:endParaRPr lang="en-US"/>
           </a:p>
@@ -2564,7 +2583,7 @@
           <a:p>
             <a:fld id="{19B110E3-DCD1-4DCD-BD6F-A0D8C064B635}" type="datetimeFigureOut">
               <a:rPr lang="en-US" smtClean="0"/>
-              <a:t>9/28/2018</a:t>
+              <a:t>9/29/2018</a:t>
             </a:fld>
             <a:endParaRPr lang="en-US"/>
           </a:p>
@@ -3124,6 +3143,13 @@
   <p:clrMapOvr>
     <a:masterClrMapping/>
   </p:clrMapOvr>
+  <p:timing>
+    <p:tnLst>
+      <p:par>
+        <p:cTn id="1" dur="indefinite" restart="never" nodeType="tmRoot"/>
+      </p:par>
+    </p:tnLst>
+  </p:timing>
 </p:sld>
 </file>
 
@@ -3279,6 +3305,13 @@
   <p:clrMapOvr>
     <a:masterClrMapping/>
   </p:clrMapOvr>
+  <p:timing>
+    <p:tnLst>
+      <p:par>
+        <p:cTn id="1" dur="indefinite" restart="never" nodeType="tmRoot"/>
+      </p:par>
+    </p:tnLst>
+  </p:timing>
 </p:sld>
 </file>
 
@@ -3332,25 +3365,32 @@
             <p:ph idx="1"/>
           </p:nvPr>
         </p:nvSpPr>
-        <p:spPr/>
+        <p:spPr>
+          <a:xfrm>
+            <a:off x="838200" y="1825625"/>
+            <a:ext cx="10515600" cy="2829502"/>
+          </a:xfrm>
+        </p:spPr>
         <p:txBody>
           <a:bodyPr>
-            <a:normAutofit fontScale="85000" lnSpcReduction="20000"/>
+            <a:normAutofit fontScale="70000" lnSpcReduction="20000"/>
           </a:bodyPr>
           <a:lstStyle/>
           <a:p>
-            <a:pPr marL="0" indent="0">
-              <a:buNone/>
-            </a:pPr>
-            <a:r>
-              <a:rPr lang="en-US" dirty="0" smtClean="0"/>
-              <a:t>* Using VBA scripts, create an 8x8 grid with alternating red and black squares.</a:t>
-            </a:r>
-          </a:p>
-          <a:p>
-            <a:pPr marL="0" indent="0">
-              <a:buNone/>
-            </a:pPr>
+            <a:r>
+              <a:rPr lang="en-US" dirty="0" smtClean="0"/>
+              <a:t>Using </a:t>
+            </a:r>
+            <a:r>
+              <a:rPr lang="en-US" dirty="0" smtClean="0"/>
+              <a:t>VBA scripts, create an 8x8 grid with alternating red and black squares</a:t>
+            </a:r>
+            <a:r>
+              <a:rPr lang="en-US" dirty="0" smtClean="0"/>
+              <a:t>.</a:t>
+            </a:r>
+          </a:p>
+          <a:p>
             <a:endParaRPr lang="en-US" dirty="0" smtClean="0"/>
           </a:p>
           <a:p>
@@ -3361,11 +3401,6 @@
               <a:rPr lang="en-US" dirty="0" smtClean="0"/>
               <a:t>Hints</a:t>
             </a:r>
-          </a:p>
-          <a:p>
-            <a:pPr marL="0" indent="0">
-              <a:buNone/>
-            </a:pPr>
             <a:endParaRPr lang="en-US" dirty="0" smtClean="0"/>
           </a:p>
           <a:p>
@@ -3374,13 +3409,12 @@
             </a:pPr>
             <a:r>
               <a:rPr lang="en-US" dirty="0" smtClean="0"/>
-              <a:t>* You will need to use nested for loops, conditionals, mods, and formatting to create the board.</a:t>
-            </a:r>
-          </a:p>
-          <a:p>
-            <a:pPr marL="0" indent="0">
-              <a:buNone/>
-            </a:pPr>
+              <a:t>* You will need to use nested for loops, conditionals, mods, and formatting to create the board</a:t>
+            </a:r>
+            <a:r>
+              <a:rPr lang="en-US" dirty="0" smtClean="0"/>
+              <a:t>.</a:t>
+            </a:r>
             <a:endParaRPr lang="en-US" dirty="0" smtClean="0"/>
           </a:p>
           <a:p>
@@ -3389,13 +3423,12 @@
             </a:pPr>
             <a:r>
               <a:rPr lang="en-US" dirty="0" smtClean="0"/>
-              <a:t>* This is a tricky problem! Try to pseudocode a plan first.</a:t>
-            </a:r>
-          </a:p>
-          <a:p>
-            <a:pPr marL="0" indent="0">
-              <a:buNone/>
-            </a:pPr>
+              <a:t>* This is a tricky problem! Try to pseudocode a plan first</a:t>
+            </a:r>
+            <a:r>
+              <a:rPr lang="en-US" dirty="0" smtClean="0"/>
+              <a:t>.</a:t>
+            </a:r>
             <a:endParaRPr lang="en-US" dirty="0" smtClean="0"/>
           </a:p>
           <a:p>
@@ -3404,7 +3437,11 @@
             </a:pPr>
             <a:r>
               <a:rPr lang="en-US" dirty="0" smtClean="0"/>
-              <a:t>  * Unlike previous activities, this activity can be solved in a multitude of different ways. While some methods may be more efficient than others, simply finding a solution to the problem is a great start!</a:t>
+              <a:t>  * Unlike previous activities, this activity can be solved in a multitude of different ways. While some methods may be more efficient than others, simply finding a solution to the problem is a great start</a:t>
+            </a:r>
+            <a:r>
+              <a:rPr lang="en-US" dirty="0" smtClean="0"/>
+              <a:t>!</a:t>
             </a:r>
           </a:p>
           <a:p>
@@ -3413,8 +3450,56 @@
             </a:pPr>
             <a:endParaRPr lang="en-US" dirty="0"/>
           </a:p>
-        </p:txBody>
-      </p:sp>
+          <a:p>
+            <a:pPr marL="0" indent="0">
+              <a:buNone/>
+            </a:pPr>
+            <a:endParaRPr lang="en-US" dirty="0" smtClean="0"/>
+          </a:p>
+          <a:p>
+            <a:pPr marL="0" indent="0">
+              <a:buNone/>
+            </a:pPr>
+            <a:endParaRPr lang="en-US" dirty="0" smtClean="0"/>
+          </a:p>
+          <a:p>
+            <a:pPr marL="0" indent="0">
+              <a:buNone/>
+            </a:pPr>
+            <a:endParaRPr lang="en-US" dirty="0"/>
+          </a:p>
+          <a:p>
+            <a:pPr marL="0" indent="0">
+              <a:buNone/>
+            </a:pPr>
+            <a:endParaRPr lang="en-US" dirty="0"/>
+          </a:p>
+        </p:txBody>
+      </p:sp>
+      <p:pic>
+        <p:nvPicPr>
+          <p:cNvPr id="4" name="Picture 3"/>
+          <p:cNvPicPr>
+            <a:picLocks noChangeAspect="1"/>
+          </p:cNvPicPr>
+          <p:nvPr/>
+        </p:nvPicPr>
+        <p:blipFill>
+          <a:blip r:embed="rId2"/>
+          <a:stretch>
+            <a:fillRect/>
+          </a:stretch>
+        </p:blipFill>
+        <p:spPr>
+          <a:xfrm>
+            <a:off x="3641767" y="5092227"/>
+            <a:ext cx="4908465" cy="1183200"/>
+          </a:xfrm>
+          <a:prstGeom prst="rect">
+            <a:avLst/>
+          </a:prstGeom>
+        </p:spPr>
+      </p:pic>
     </p:spTree>
     <p:extLst>
       <p:ext uri="{BB962C8B-B14F-4D97-AF65-F5344CB8AC3E}">
@@ -3425,6 +3510,13 @@
   <p:clrMapOvr>
     <a:masterClrMapping/>
   </p:clrMapOvr>
+  <p:timing>
+    <p:tnLst>
+      <p:par>
+        <p:cTn id="1" dur="indefinite" restart="never" nodeType="tmRoot"/>
+      </p:par>
+    </p:tnLst>
+  </p:timing>
 </p:sld>
 </file>
 
@@ -3504,21 +3596,6 @@
               <a:buNone/>
             </a:pPr>
             <a:r>
-              <a:rPr lang="en-US" dirty="0" smtClean="0"/>
-              <a:t>* For the _Basic_ assignment, create a single pop-up message for each of the Credit Card brands listed by looping through the list.</a:t>
-            </a:r>
-          </a:p>
-          <a:p>
-            <a:pPr marL="0" indent="0">
-              <a:buNone/>
-            </a:pPr>
-            <a:endParaRPr lang="en-US" dirty="0" smtClean="0"/>
-          </a:p>
-          <a:p>
-            <a:pPr marL="0" indent="0">
-              <a:buNone/>
-            </a:pPr>
-            <a:r>
               <a:rPr lang="en-US" b="1" dirty="0" smtClean="0"/>
               <a:t>* For the _Advanced_ assignment, tally the total credit card purchases for each Credit Card brand and add it to the summary table.</a:t>
             </a:r>
@@ -3541,6 +3618,13 @@
   <p:clrMapOvr>
     <a:masterClrMapping/>
   </p:clrMapOvr>
+  <p:timing>
+    <p:tnLst>
+      <p:par>
+        <p:cTn id="1" dur="indefinite" restart="never" nodeType="tmRoot"/>
+      </p:par>
+    </p:tnLst>
+  </p:timing>
 </p:sld>
 </file>
 
@@ -3713,6 +3797,13 @@
   <p:clrMapOvr>
     <a:masterClrMapping/>
   </p:clrMapOvr>
+  <p:timing>
+    <p:tnLst>
+      <p:par>
+        <p:cTn id="1" dur="indefinite" restart="never" nodeType="tmRoot"/>
+      </p:par>
+    </p:tnLst>
+  </p:timing>
 </p:sld>
 </file>
 
@@ -3859,6 +3950,13 @@
   <p:clrMapOvr>
     <a:masterClrMapping/>
   </p:clrMapOvr>
+  <p:timing>
+    <p:tnLst>
+      <p:par>
+        <p:cTn id="1" dur="indefinite" restart="never" nodeType="tmRoot"/>
+      </p:par>
+    </p:tnLst>
+  </p:timing>
 </p:sld>
 </file>
 

</xml_diff>